<commit_message>
fix: deduplicate Gloria on loading screen, update feature timeline
- WelcomeScreen: use BOTS.slice(1,7) to skip duplicate Gloria avatar
- Update FEATURE-DEVELOPMENT-TIMELINE.md with phases 5-7 (Jan-Feb 2026)
- Update PPTX with Gloria Interview feature
- Bump BUILD_NUMBER to 7, sw.js cache bust b7

Co-authored-by: Cursor <cursoragent@cursor.com>
</commit_message>
<xml_diff>
--- a/DOCUMENTATION/Meaningful-Conversations-Access-Matrix-Pricing.pptx
+++ b/DOCUMENTATION/Meaningful-Conversations-Access-Matrix-Pricing.pptx
@@ -5450,7 +5450,7 @@
         </p:nvGraphicFramePr>
         <p:xfrm>
           <a:off x="365760" y="1051560"/>
-          <a:ext cx="11430000" cy="5650992"/>
+          <a:ext cx="11430000" cy="5669280"/>
         </p:xfrm>
         <a:graphic>
           <a:graphicData uri="http://schemas.openxmlformats.org/drawingml/2006/table">
@@ -5465,7 +5465,7 @@
                 <a:gridCol w="1760220"/>
                 <a:gridCol w="1760220"/>
               </a:tblGrid>
-              <a:tr h="353187">
+              <a:tr h="333487">
                 <a:tc>
                   <a:txBody>
                     <a:bodyPr/>
@@ -5603,7 +5603,7 @@
                   </a:tcPr>
                 </a:tc>
               </a:tr>
-              <a:tr h="353187">
+              <a:tr h="333487">
                 <a:tc>
                   <a:txBody>
                     <a:bodyPr/>
@@ -5713,7 +5713,7 @@
                   </a:tcPr>
                 </a:tc>
               </a:tr>
-              <a:tr h="353187">
+              <a:tr h="333487">
                 <a:tc>
                   <a:txBody>
                     <a:bodyPr/>
@@ -5835,7 +5835,7 @@
                   </a:tcPr>
                 </a:tc>
               </a:tr>
-              <a:tr h="353187">
+              <a:tr h="333487">
                 <a:tc>
                   <a:txBody>
                     <a:bodyPr/>
@@ -5850,13 +5850,135 @@
                         </a:defRPr>
                       </a:pPr>
                       <a:r>
+                        <a:t>Gloria Interview (Strukturierte Interviews)</a:t>
+                      </a:r>
+                    </a:p>
+                  </a:txBody>
+                  <a:tcPr anchor="ctr" marL="45720" marR="45720" marT="27432" marB="27432">
+                    <a:solidFill>
+                      <a:srgbClr val="FFFFFF"/>
+                    </a:solidFill>
+                  </a:tcPr>
+                </a:tc>
+                <a:tc>
+                  <a:txBody>
+                    <a:bodyPr/>
+                    <a:lstStyle/>
+                    <a:p>
+                      <a:pPr algn="ctr">
+                        <a:defRPr sz="1000" b="0">
+                          <a:solidFill>
+                            <a:srgbClr val="BBBBBB"/>
+                          </a:solidFill>
+                          <a:latin typeface="Calibri"/>
+                        </a:defRPr>
+                      </a:pPr>
+                      <a:r>
+                        <a:t>—</a:t>
+                      </a:r>
+                    </a:p>
+                  </a:txBody>
+                  <a:tcPr anchor="ctr" marL="45720" marR="45720" marT="27432" marB="27432">
+                    <a:solidFill>
+                      <a:srgbClr val="FFFFFF"/>
+                    </a:solidFill>
+                  </a:tcPr>
+                </a:tc>
+                <a:tc>
+                  <a:txBody>
+                    <a:bodyPr/>
+                    <a:lstStyle/>
+                    <a:p>
+                      <a:pPr algn="ctr">
+                        <a:defRPr sz="1000" b="0">
+                          <a:solidFill>
+                            <a:srgbClr val="16A34A"/>
+                          </a:solidFill>
+                          <a:latin typeface="Calibri"/>
+                        </a:defRPr>
+                      </a:pPr>
+                      <a:r>
+                        <a:t>✅</a:t>
+                      </a:r>
+                    </a:p>
+                  </a:txBody>
+                  <a:tcPr anchor="ctr" marL="45720" marR="45720" marT="27432" marB="27432">
+                    <a:solidFill>
+                      <a:srgbClr val="FFFFFF"/>
+                    </a:solidFill>
+                  </a:tcPr>
+                </a:tc>
+                <a:tc>
+                  <a:txBody>
+                    <a:bodyPr/>
+                    <a:lstStyle/>
+                    <a:p>
+                      <a:pPr algn="ctr">
+                        <a:defRPr sz="1000" b="0">
+                          <a:solidFill>
+                            <a:srgbClr val="16A34A"/>
+                          </a:solidFill>
+                          <a:latin typeface="Calibri"/>
+                        </a:defRPr>
+                      </a:pPr>
+                      <a:r>
+                        <a:t>✅</a:t>
+                      </a:r>
+                    </a:p>
+                  </a:txBody>
+                  <a:tcPr anchor="ctr" marL="45720" marR="45720" marT="27432" marB="27432">
+                    <a:solidFill>
+                      <a:srgbClr val="FFFFFF"/>
+                    </a:solidFill>
+                  </a:tcPr>
+                </a:tc>
+                <a:tc>
+                  <a:txBody>
+                    <a:bodyPr/>
+                    <a:lstStyle/>
+                    <a:p>
+                      <a:pPr algn="ctr">
+                        <a:defRPr sz="1000" b="0">
+                          <a:solidFill>
+                            <a:srgbClr val="16A34A"/>
+                          </a:solidFill>
+                          <a:latin typeface="Calibri"/>
+                        </a:defRPr>
+                      </a:pPr>
+                      <a:r>
+                        <a:t>✅</a:t>
+                      </a:r>
+                    </a:p>
+                  </a:txBody>
+                  <a:tcPr anchor="ctr" marL="45720" marR="45720" marT="27432" marB="27432">
+                    <a:solidFill>
+                      <a:srgbClr val="FFFFFF"/>
+                    </a:solidFill>
+                  </a:tcPr>
+                </a:tc>
+              </a:tr>
+              <a:tr h="333487">
+                <a:tc>
+                  <a:txBody>
+                    <a:bodyPr/>
+                    <a:lstStyle/>
+                    <a:p>
+                      <a:pPr algn="l">
+                        <a:defRPr sz="1000" b="0">
+                          <a:solidFill>
+                            <a:srgbClr val="1F2937"/>
+                          </a:solidFill>
+                          <a:latin typeface="Calibri"/>
+                        </a:defRPr>
+                      </a:pPr>
+                      <a:r>
                         <a:t>Gloria (Onboarding)</a:t>
                       </a:r>
                     </a:p>
                   </a:txBody>
                   <a:tcPr anchor="ctr" marL="45720" marR="45720" marT="27432" marB="27432">
                     <a:solidFill>
-                      <a:srgbClr val="FFFFFF"/>
+                      <a:srgbClr val="F3F4F6"/>
                     </a:solidFill>
                   </a:tcPr>
                 </a:tc>
@@ -5880,7 +6002,7 @@
                   </a:txBody>
                   <a:tcPr anchor="ctr" marL="45720" marR="45720" marT="27432" marB="27432">
                     <a:solidFill>
-                      <a:srgbClr val="FFFFFF"/>
+                      <a:srgbClr val="F3F4F6"/>
                     </a:solidFill>
                   </a:tcPr>
                 </a:tc>
@@ -5904,7 +6026,7 @@
                   </a:txBody>
                   <a:tcPr anchor="ctr" marL="45720" marR="45720" marT="27432" marB="27432">
                     <a:solidFill>
-                      <a:srgbClr val="FFFFFF"/>
+                      <a:srgbClr val="F3F4F6"/>
                     </a:solidFill>
                   </a:tcPr>
                 </a:tc>
@@ -5928,7 +6050,7 @@
                   </a:txBody>
                   <a:tcPr anchor="ctr" marL="45720" marR="45720" marT="27432" marB="27432">
                     <a:solidFill>
-                      <a:srgbClr val="FFFFFF"/>
+                      <a:srgbClr val="F3F4F6"/>
                     </a:solidFill>
                   </a:tcPr>
                 </a:tc>
@@ -5952,12 +6074,12 @@
                   </a:txBody>
                   <a:tcPr anchor="ctr" marL="45720" marR="45720" marT="27432" marB="27432">
                     <a:solidFill>
-                      <a:srgbClr val="FFFFFF"/>
+                      <a:srgbClr val="F3F4F6"/>
                     </a:solidFill>
                   </a:tcPr>
                 </a:tc>
               </a:tr>
-              <a:tr h="353187">
+              <a:tr h="333487">
                 <a:tc>
                   <a:txBody>
                     <a:bodyPr/>
@@ -6067,7 +6189,7 @@
                   </a:tcPr>
                 </a:tc>
               </a:tr>
-              <a:tr h="353187">
+              <a:tr h="333487">
                 <a:tc>
                   <a:txBody>
                     <a:bodyPr/>
@@ -6088,6 +6210,128 @@
                   </a:txBody>
                   <a:tcPr anchor="ctr" marL="45720" marR="45720" marT="27432" marB="27432">
                     <a:solidFill>
+                      <a:srgbClr val="F3F4F6"/>
+                    </a:solidFill>
+                  </a:tcPr>
+                </a:tc>
+                <a:tc>
+                  <a:txBody>
+                    <a:bodyPr/>
+                    <a:lstStyle/>
+                    <a:p>
+                      <a:pPr algn="ctr">
+                        <a:defRPr sz="1000" b="0">
+                          <a:solidFill>
+                            <a:srgbClr val="16A34A"/>
+                          </a:solidFill>
+                          <a:latin typeface="Calibri"/>
+                        </a:defRPr>
+                      </a:pPr>
+                      <a:r>
+                        <a:t>✅</a:t>
+                      </a:r>
+                    </a:p>
+                  </a:txBody>
+                  <a:tcPr anchor="ctr" marL="45720" marR="45720" marT="27432" marB="27432">
+                    <a:solidFill>
+                      <a:srgbClr val="F3F4F6"/>
+                    </a:solidFill>
+                  </a:tcPr>
+                </a:tc>
+                <a:tc>
+                  <a:txBody>
+                    <a:bodyPr/>
+                    <a:lstStyle/>
+                    <a:p>
+                      <a:pPr algn="ctr">
+                        <a:defRPr sz="1000" b="0">
+                          <a:solidFill>
+                            <a:srgbClr val="16A34A"/>
+                          </a:solidFill>
+                          <a:latin typeface="Calibri"/>
+                        </a:defRPr>
+                      </a:pPr>
+                      <a:r>
+                        <a:t>✅</a:t>
+                      </a:r>
+                    </a:p>
+                  </a:txBody>
+                  <a:tcPr anchor="ctr" marL="45720" marR="45720" marT="27432" marB="27432">
+                    <a:solidFill>
+                      <a:srgbClr val="F3F4F6"/>
+                    </a:solidFill>
+                  </a:tcPr>
+                </a:tc>
+                <a:tc>
+                  <a:txBody>
+                    <a:bodyPr/>
+                    <a:lstStyle/>
+                    <a:p>
+                      <a:pPr algn="ctr">
+                        <a:defRPr sz="1000" b="0">
+                          <a:solidFill>
+                            <a:srgbClr val="16A34A"/>
+                          </a:solidFill>
+                          <a:latin typeface="Calibri"/>
+                        </a:defRPr>
+                      </a:pPr>
+                      <a:r>
+                        <a:t>✅</a:t>
+                      </a:r>
+                    </a:p>
+                  </a:txBody>
+                  <a:tcPr anchor="ctr" marL="45720" marR="45720" marT="27432" marB="27432">
+                    <a:solidFill>
+                      <a:srgbClr val="F3F4F6"/>
+                    </a:solidFill>
+                  </a:tcPr>
+                </a:tc>
+                <a:tc>
+                  <a:txBody>
+                    <a:bodyPr/>
+                    <a:lstStyle/>
+                    <a:p>
+                      <a:pPr algn="ctr">
+                        <a:defRPr sz="1000" b="0">
+                          <a:solidFill>
+                            <a:srgbClr val="16A34A"/>
+                          </a:solidFill>
+                          <a:latin typeface="Calibri"/>
+                        </a:defRPr>
+                      </a:pPr>
+                      <a:r>
+                        <a:t>✅</a:t>
+                      </a:r>
+                    </a:p>
+                  </a:txBody>
+                  <a:tcPr anchor="ctr" marL="45720" marR="45720" marT="27432" marB="27432">
+                    <a:solidFill>
+                      <a:srgbClr val="F3F4F6"/>
+                    </a:solidFill>
+                  </a:tcPr>
+                </a:tc>
+              </a:tr>
+              <a:tr h="333487">
+                <a:tc>
+                  <a:txBody>
+                    <a:bodyPr/>
+                    <a:lstStyle/>
+                    <a:p>
+                      <a:pPr algn="l">
+                        <a:defRPr sz="1000" b="0">
+                          <a:solidFill>
+                            <a:srgbClr val="1F2937"/>
+                          </a:solidFill>
+                          <a:latin typeface="Calibri"/>
+                        </a:defRPr>
+                      </a:pPr>
+                      <a:r>
+                        <a:t>Ava (Strategisch)</a:t>
+                      </a:r>
+                    </a:p>
+                  </a:txBody>
+                  <a:tcPr anchor="ctr" marL="45720" marR="45720" marT="27432" marB="27432">
+                    <a:solidFill>
                       <a:srgbClr val="FFFFFF"/>
                     </a:solidFill>
                   </a:tcPr>
@@ -6189,7 +6433,7 @@
                   </a:tcPr>
                 </a:tc>
               </a:tr>
-              <a:tr h="353187">
+              <a:tr h="333487">
                 <a:tc>
                   <a:txBody>
                     <a:bodyPr/>
@@ -6204,7 +6448,7 @@
                         </a:defRPr>
                       </a:pPr>
                       <a:r>
-                        <a:t>Ava (Strategisch)</a:t>
+                        <a:t>Kenji (Stoisch)</a:t>
                       </a:r>
                     </a:p>
                   </a:txBody>
@@ -6222,6 +6466,54 @@
                       <a:pPr algn="ctr">
                         <a:defRPr sz="1000" b="0">
                           <a:solidFill>
+                            <a:srgbClr val="BBBBBB"/>
+                          </a:solidFill>
+                          <a:latin typeface="Calibri"/>
+                        </a:defRPr>
+                      </a:pPr>
+                      <a:r>
+                        <a:t>—</a:t>
+                      </a:r>
+                    </a:p>
+                  </a:txBody>
+                  <a:tcPr anchor="ctr" marL="45720" marR="45720" marT="27432" marB="27432">
+                    <a:solidFill>
+                      <a:srgbClr val="F3F4F6"/>
+                    </a:solidFill>
+                  </a:tcPr>
+                </a:tc>
+                <a:tc>
+                  <a:txBody>
+                    <a:bodyPr/>
+                    <a:lstStyle/>
+                    <a:p>
+                      <a:pPr algn="ctr">
+                        <a:defRPr sz="1000" b="0">
+                          <a:solidFill>
+                            <a:srgbClr val="BBBBBB"/>
+                          </a:solidFill>
+                          <a:latin typeface="Calibri"/>
+                        </a:defRPr>
+                      </a:pPr>
+                      <a:r>
+                        <a:t>—</a:t>
+                      </a:r>
+                    </a:p>
+                  </a:txBody>
+                  <a:tcPr anchor="ctr" marL="45720" marR="45720" marT="27432" marB="27432">
+                    <a:solidFill>
+                      <a:srgbClr val="F3F4F6"/>
+                    </a:solidFill>
+                  </a:tcPr>
+                </a:tc>
+                <a:tc>
+                  <a:txBody>
+                    <a:bodyPr/>
+                    <a:lstStyle/>
+                    <a:p>
+                      <a:pPr algn="ctr">
+                        <a:defRPr sz="1000" b="0">
+                          <a:solidFill>
                             <a:srgbClr val="16A34A"/>
                           </a:solidFill>
                           <a:latin typeface="Calibri"/>
@@ -6262,6 +6554,80 @@
                     </a:solidFill>
                   </a:tcPr>
                 </a:tc>
+              </a:tr>
+              <a:tr h="333487">
+                <a:tc>
+                  <a:txBody>
+                    <a:bodyPr/>
+                    <a:lstStyle/>
+                    <a:p>
+                      <a:pPr algn="l">
+                        <a:defRPr sz="1000" b="0">
+                          <a:solidFill>
+                            <a:srgbClr val="1F2937"/>
+                          </a:solidFill>
+                          <a:latin typeface="Calibri"/>
+                        </a:defRPr>
+                      </a:pPr>
+                      <a:r>
+                        <a:t>Chloe (Strukturierte Reflexion)</a:t>
+                      </a:r>
+                    </a:p>
+                  </a:txBody>
+                  <a:tcPr anchor="ctr" marL="45720" marR="45720" marT="27432" marB="27432">
+                    <a:solidFill>
+                      <a:srgbClr val="FFFFFF"/>
+                    </a:solidFill>
+                  </a:tcPr>
+                </a:tc>
+                <a:tc>
+                  <a:txBody>
+                    <a:bodyPr/>
+                    <a:lstStyle/>
+                    <a:p>
+                      <a:pPr algn="ctr">
+                        <a:defRPr sz="1000" b="0">
+                          <a:solidFill>
+                            <a:srgbClr val="BBBBBB"/>
+                          </a:solidFill>
+                          <a:latin typeface="Calibri"/>
+                        </a:defRPr>
+                      </a:pPr>
+                      <a:r>
+                        <a:t>—</a:t>
+                      </a:r>
+                    </a:p>
+                  </a:txBody>
+                  <a:tcPr anchor="ctr" marL="45720" marR="45720" marT="27432" marB="27432">
+                    <a:solidFill>
+                      <a:srgbClr val="FFFFFF"/>
+                    </a:solidFill>
+                  </a:tcPr>
+                </a:tc>
+                <a:tc>
+                  <a:txBody>
+                    <a:bodyPr/>
+                    <a:lstStyle/>
+                    <a:p>
+                      <a:pPr algn="ctr">
+                        <a:defRPr sz="1000" b="0">
+                          <a:solidFill>
+                            <a:srgbClr val="BBBBBB"/>
+                          </a:solidFill>
+                          <a:latin typeface="Calibri"/>
+                        </a:defRPr>
+                      </a:pPr>
+                      <a:r>
+                        <a:t>—</a:t>
+                      </a:r>
+                    </a:p>
+                  </a:txBody>
+                  <a:tcPr anchor="ctr" marL="45720" marR="45720" marT="27432" marB="27432">
+                    <a:solidFill>
+                      <a:srgbClr val="FFFFFF"/>
+                    </a:solidFill>
+                  </a:tcPr>
+                </a:tc>
                 <a:tc>
                   <a:txBody>
                     <a:bodyPr/>
@@ -6282,7 +6648,7 @@
                   </a:txBody>
                   <a:tcPr anchor="ctr" marL="45720" marR="45720" marT="27432" marB="27432">
                     <a:solidFill>
-                      <a:srgbClr val="F3F4F6"/>
+                      <a:srgbClr val="FFFFFF"/>
                     </a:solidFill>
                   </a:tcPr>
                 </a:tc>
@@ -6306,256 +6672,12 @@
                   </a:txBody>
                   <a:tcPr anchor="ctr" marL="45720" marR="45720" marT="27432" marB="27432">
                     <a:solidFill>
-                      <a:srgbClr val="F3F4F6"/>
+                      <a:srgbClr val="FFFFFF"/>
                     </a:solidFill>
                   </a:tcPr>
                 </a:tc>
               </a:tr>
-              <a:tr h="353187">
-                <a:tc>
-                  <a:txBody>
-                    <a:bodyPr/>
-                    <a:lstStyle/>
-                    <a:p>
-                      <a:pPr algn="l">
-                        <a:defRPr sz="1000" b="0">
-                          <a:solidFill>
-                            <a:srgbClr val="1F2937"/>
-                          </a:solidFill>
-                          <a:latin typeface="Calibri"/>
-                        </a:defRPr>
-                      </a:pPr>
-                      <a:r>
-                        <a:t>Kenji (Stoisch)</a:t>
-                      </a:r>
-                    </a:p>
-                  </a:txBody>
-                  <a:tcPr anchor="ctr" marL="45720" marR="45720" marT="27432" marB="27432">
-                    <a:solidFill>
-                      <a:srgbClr val="FFFFFF"/>
-                    </a:solidFill>
-                  </a:tcPr>
-                </a:tc>
-                <a:tc>
-                  <a:txBody>
-                    <a:bodyPr/>
-                    <a:lstStyle/>
-                    <a:p>
-                      <a:pPr algn="ctr">
-                        <a:defRPr sz="1000" b="0">
-                          <a:solidFill>
-                            <a:srgbClr val="BBBBBB"/>
-                          </a:solidFill>
-                          <a:latin typeface="Calibri"/>
-                        </a:defRPr>
-                      </a:pPr>
-                      <a:r>
-                        <a:t>—</a:t>
-                      </a:r>
-                    </a:p>
-                  </a:txBody>
-                  <a:tcPr anchor="ctr" marL="45720" marR="45720" marT="27432" marB="27432">
-                    <a:solidFill>
-                      <a:srgbClr val="FFFFFF"/>
-                    </a:solidFill>
-                  </a:tcPr>
-                </a:tc>
-                <a:tc>
-                  <a:txBody>
-                    <a:bodyPr/>
-                    <a:lstStyle/>
-                    <a:p>
-                      <a:pPr algn="ctr">
-                        <a:defRPr sz="1000" b="0">
-                          <a:solidFill>
-                            <a:srgbClr val="BBBBBB"/>
-                          </a:solidFill>
-                          <a:latin typeface="Calibri"/>
-                        </a:defRPr>
-                      </a:pPr>
-                      <a:r>
-                        <a:t>—</a:t>
-                      </a:r>
-                    </a:p>
-                  </a:txBody>
-                  <a:tcPr anchor="ctr" marL="45720" marR="45720" marT="27432" marB="27432">
-                    <a:solidFill>
-                      <a:srgbClr val="FFFFFF"/>
-                    </a:solidFill>
-                  </a:tcPr>
-                </a:tc>
-                <a:tc>
-                  <a:txBody>
-                    <a:bodyPr/>
-                    <a:lstStyle/>
-                    <a:p>
-                      <a:pPr algn="ctr">
-                        <a:defRPr sz="1000" b="0">
-                          <a:solidFill>
-                            <a:srgbClr val="16A34A"/>
-                          </a:solidFill>
-                          <a:latin typeface="Calibri"/>
-                        </a:defRPr>
-                      </a:pPr>
-                      <a:r>
-                        <a:t>✅</a:t>
-                      </a:r>
-                    </a:p>
-                  </a:txBody>
-                  <a:tcPr anchor="ctr" marL="45720" marR="45720" marT="27432" marB="27432">
-                    <a:solidFill>
-                      <a:srgbClr val="FFFFFF"/>
-                    </a:solidFill>
-                  </a:tcPr>
-                </a:tc>
-                <a:tc>
-                  <a:txBody>
-                    <a:bodyPr/>
-                    <a:lstStyle/>
-                    <a:p>
-                      <a:pPr algn="ctr">
-                        <a:defRPr sz="1000" b="0">
-                          <a:solidFill>
-                            <a:srgbClr val="16A34A"/>
-                          </a:solidFill>
-                          <a:latin typeface="Calibri"/>
-                        </a:defRPr>
-                      </a:pPr>
-                      <a:r>
-                        <a:t>✅</a:t>
-                      </a:r>
-                    </a:p>
-                  </a:txBody>
-                  <a:tcPr anchor="ctr" marL="45720" marR="45720" marT="27432" marB="27432">
-                    <a:solidFill>
-                      <a:srgbClr val="FFFFFF"/>
-                    </a:solidFill>
-                  </a:tcPr>
-                </a:tc>
-              </a:tr>
-              <a:tr h="353187">
-                <a:tc>
-                  <a:txBody>
-                    <a:bodyPr/>
-                    <a:lstStyle/>
-                    <a:p>
-                      <a:pPr algn="l">
-                        <a:defRPr sz="1000" b="0">
-                          <a:solidFill>
-                            <a:srgbClr val="1F2937"/>
-                          </a:solidFill>
-                          <a:latin typeface="Calibri"/>
-                        </a:defRPr>
-                      </a:pPr>
-                      <a:r>
-                        <a:t>Chloe (Strukturierte Reflexion)</a:t>
-                      </a:r>
-                    </a:p>
-                  </a:txBody>
-                  <a:tcPr anchor="ctr" marL="45720" marR="45720" marT="27432" marB="27432">
-                    <a:solidFill>
-                      <a:srgbClr val="F3F4F6"/>
-                    </a:solidFill>
-                  </a:tcPr>
-                </a:tc>
-                <a:tc>
-                  <a:txBody>
-                    <a:bodyPr/>
-                    <a:lstStyle/>
-                    <a:p>
-                      <a:pPr algn="ctr">
-                        <a:defRPr sz="1000" b="0">
-                          <a:solidFill>
-                            <a:srgbClr val="BBBBBB"/>
-                          </a:solidFill>
-                          <a:latin typeface="Calibri"/>
-                        </a:defRPr>
-                      </a:pPr>
-                      <a:r>
-                        <a:t>—</a:t>
-                      </a:r>
-                    </a:p>
-                  </a:txBody>
-                  <a:tcPr anchor="ctr" marL="45720" marR="45720" marT="27432" marB="27432">
-                    <a:solidFill>
-                      <a:srgbClr val="F3F4F6"/>
-                    </a:solidFill>
-                  </a:tcPr>
-                </a:tc>
-                <a:tc>
-                  <a:txBody>
-                    <a:bodyPr/>
-                    <a:lstStyle/>
-                    <a:p>
-                      <a:pPr algn="ctr">
-                        <a:defRPr sz="1000" b="0">
-                          <a:solidFill>
-                            <a:srgbClr val="BBBBBB"/>
-                          </a:solidFill>
-                          <a:latin typeface="Calibri"/>
-                        </a:defRPr>
-                      </a:pPr>
-                      <a:r>
-                        <a:t>—</a:t>
-                      </a:r>
-                    </a:p>
-                  </a:txBody>
-                  <a:tcPr anchor="ctr" marL="45720" marR="45720" marT="27432" marB="27432">
-                    <a:solidFill>
-                      <a:srgbClr val="F3F4F6"/>
-                    </a:solidFill>
-                  </a:tcPr>
-                </a:tc>
-                <a:tc>
-                  <a:txBody>
-                    <a:bodyPr/>
-                    <a:lstStyle/>
-                    <a:p>
-                      <a:pPr algn="ctr">
-                        <a:defRPr sz="1000" b="0">
-                          <a:solidFill>
-                            <a:srgbClr val="16A34A"/>
-                          </a:solidFill>
-                          <a:latin typeface="Calibri"/>
-                        </a:defRPr>
-                      </a:pPr>
-                      <a:r>
-                        <a:t>✅</a:t>
-                      </a:r>
-                    </a:p>
-                  </a:txBody>
-                  <a:tcPr anchor="ctr" marL="45720" marR="45720" marT="27432" marB="27432">
-                    <a:solidFill>
-                      <a:srgbClr val="F3F4F6"/>
-                    </a:solidFill>
-                  </a:tcPr>
-                </a:tc>
-                <a:tc>
-                  <a:txBody>
-                    <a:bodyPr/>
-                    <a:lstStyle/>
-                    <a:p>
-                      <a:pPr algn="ctr">
-                        <a:defRPr sz="1000" b="0">
-                          <a:solidFill>
-                            <a:srgbClr val="16A34A"/>
-                          </a:solidFill>
-                          <a:latin typeface="Calibri"/>
-                        </a:defRPr>
-                      </a:pPr>
-                      <a:r>
-                        <a:t>✅</a:t>
-                      </a:r>
-                    </a:p>
-                  </a:txBody>
-                  <a:tcPr anchor="ctr" marL="45720" marR="45720" marT="27432" marB="27432">
-                    <a:solidFill>
-                      <a:srgbClr val="F3F4F6"/>
-                    </a:solidFill>
-                  </a:tcPr>
-                </a:tc>
-              </a:tr>
-              <a:tr h="353187">
+              <a:tr h="333487">
                 <a:tc>
                   <a:txBody>
                     <a:bodyPr/>
@@ -6665,7 +6787,7 @@
                   </a:tcPr>
                 </a:tc>
               </a:tr>
-              <a:tr h="353187">
+              <a:tr h="333487">
                 <a:tc>
                   <a:txBody>
                     <a:bodyPr/>
@@ -6686,6 +6808,128 @@
                   </a:txBody>
                   <a:tcPr anchor="ctr" marL="45720" marR="45720" marT="27432" marB="27432">
                     <a:solidFill>
+                      <a:srgbClr val="FFFFFF"/>
+                    </a:solidFill>
+                  </a:tcPr>
+                </a:tc>
+                <a:tc>
+                  <a:txBody>
+                    <a:bodyPr/>
+                    <a:lstStyle/>
+                    <a:p>
+                      <a:pPr algn="ctr">
+                        <a:defRPr sz="1000" b="0">
+                          <a:solidFill>
+                            <a:srgbClr val="BBBBBB"/>
+                          </a:solidFill>
+                          <a:latin typeface="Calibri"/>
+                        </a:defRPr>
+                      </a:pPr>
+                      <a:r>
+                        <a:t>—</a:t>
+                      </a:r>
+                    </a:p>
+                  </a:txBody>
+                  <a:tcPr anchor="ctr" marL="45720" marR="45720" marT="27432" marB="27432">
+                    <a:solidFill>
+                      <a:srgbClr val="FFFFFF"/>
+                    </a:solidFill>
+                  </a:tcPr>
+                </a:tc>
+                <a:tc>
+                  <a:txBody>
+                    <a:bodyPr/>
+                    <a:lstStyle/>
+                    <a:p>
+                      <a:pPr algn="ctr">
+                        <a:defRPr sz="1000" b="0">
+                          <a:solidFill>
+                            <a:srgbClr val="BBBBBB"/>
+                          </a:solidFill>
+                          <a:latin typeface="Calibri"/>
+                        </a:defRPr>
+                      </a:pPr>
+                      <a:r>
+                        <a:t>—</a:t>
+                      </a:r>
+                    </a:p>
+                  </a:txBody>
+                  <a:tcPr anchor="ctr" marL="45720" marR="45720" marT="27432" marB="27432">
+                    <a:solidFill>
+                      <a:srgbClr val="FFFFFF"/>
+                    </a:solidFill>
+                  </a:tcPr>
+                </a:tc>
+                <a:tc>
+                  <a:txBody>
+                    <a:bodyPr/>
+                    <a:lstStyle/>
+                    <a:p>
+                      <a:pPr algn="ctr">
+                        <a:defRPr sz="1000" b="0">
+                          <a:solidFill>
+                            <a:srgbClr val="BBBBBB"/>
+                          </a:solidFill>
+                          <a:latin typeface="Calibri"/>
+                        </a:defRPr>
+                      </a:pPr>
+                      <a:r>
+                        <a:t>—</a:t>
+                      </a:r>
+                    </a:p>
+                  </a:txBody>
+                  <a:tcPr anchor="ctr" marL="45720" marR="45720" marT="27432" marB="27432">
+                    <a:solidFill>
+                      <a:srgbClr val="FFFFFF"/>
+                    </a:solidFill>
+                  </a:tcPr>
+                </a:tc>
+                <a:tc>
+                  <a:txBody>
+                    <a:bodyPr/>
+                    <a:lstStyle/>
+                    <a:p>
+                      <a:pPr algn="ctr">
+                        <a:defRPr sz="1000" b="0">
+                          <a:solidFill>
+                            <a:srgbClr val="16A34A"/>
+                          </a:solidFill>
+                          <a:latin typeface="Calibri"/>
+                        </a:defRPr>
+                      </a:pPr>
+                      <a:r>
+                        <a:t>✅</a:t>
+                      </a:r>
+                    </a:p>
+                  </a:txBody>
+                  <a:tcPr anchor="ctr" marL="45720" marR="45720" marT="27432" marB="27432">
+                    <a:solidFill>
+                      <a:srgbClr val="FFFFFF"/>
+                    </a:solidFill>
+                  </a:tcPr>
+                </a:tc>
+              </a:tr>
+              <a:tr h="333487">
+                <a:tc>
+                  <a:txBody>
+                    <a:bodyPr/>
+                    <a:lstStyle/>
+                    <a:p>
+                      <a:pPr algn="l">
+                        <a:defRPr sz="1000" b="0">
+                          <a:solidFill>
+                            <a:srgbClr val="1F2937"/>
+                          </a:solidFill>
+                          <a:latin typeface="Calibri"/>
+                        </a:defRPr>
+                      </a:pPr>
+                      <a:r>
+                        <a:t>Victor (Systemisch)</a:t>
+                      </a:r>
+                    </a:p>
+                  </a:txBody>
+                  <a:tcPr anchor="ctr" marL="45720" marR="45720" marT="27432" marB="27432">
+                    <a:solidFill>
                       <a:srgbClr val="F3F4F6"/>
                     </a:solidFill>
                   </a:tcPr>
@@ -6787,129 +7031,7 @@
                   </a:tcPr>
                 </a:tc>
               </a:tr>
-              <a:tr h="353187">
-                <a:tc>
-                  <a:txBody>
-                    <a:bodyPr/>
-                    <a:lstStyle/>
-                    <a:p>
-                      <a:pPr algn="l">
-                        <a:defRPr sz="1000" b="0">
-                          <a:solidFill>
-                            <a:srgbClr val="1F2937"/>
-                          </a:solidFill>
-                          <a:latin typeface="Calibri"/>
-                        </a:defRPr>
-                      </a:pPr>
-                      <a:r>
-                        <a:t>Victor (Systemisch)</a:t>
-                      </a:r>
-                    </a:p>
-                  </a:txBody>
-                  <a:tcPr anchor="ctr" marL="45720" marR="45720" marT="27432" marB="27432">
-                    <a:solidFill>
-                      <a:srgbClr val="FFFFFF"/>
-                    </a:solidFill>
-                  </a:tcPr>
-                </a:tc>
-                <a:tc>
-                  <a:txBody>
-                    <a:bodyPr/>
-                    <a:lstStyle/>
-                    <a:p>
-                      <a:pPr algn="ctr">
-                        <a:defRPr sz="1000" b="0">
-                          <a:solidFill>
-                            <a:srgbClr val="BBBBBB"/>
-                          </a:solidFill>
-                          <a:latin typeface="Calibri"/>
-                        </a:defRPr>
-                      </a:pPr>
-                      <a:r>
-                        <a:t>—</a:t>
-                      </a:r>
-                    </a:p>
-                  </a:txBody>
-                  <a:tcPr anchor="ctr" marL="45720" marR="45720" marT="27432" marB="27432">
-                    <a:solidFill>
-                      <a:srgbClr val="FFFFFF"/>
-                    </a:solidFill>
-                  </a:tcPr>
-                </a:tc>
-                <a:tc>
-                  <a:txBody>
-                    <a:bodyPr/>
-                    <a:lstStyle/>
-                    <a:p>
-                      <a:pPr algn="ctr">
-                        <a:defRPr sz="1000" b="0">
-                          <a:solidFill>
-                            <a:srgbClr val="BBBBBB"/>
-                          </a:solidFill>
-                          <a:latin typeface="Calibri"/>
-                        </a:defRPr>
-                      </a:pPr>
-                      <a:r>
-                        <a:t>—</a:t>
-                      </a:r>
-                    </a:p>
-                  </a:txBody>
-                  <a:tcPr anchor="ctr" marL="45720" marR="45720" marT="27432" marB="27432">
-                    <a:solidFill>
-                      <a:srgbClr val="FFFFFF"/>
-                    </a:solidFill>
-                  </a:tcPr>
-                </a:tc>
-                <a:tc>
-                  <a:txBody>
-                    <a:bodyPr/>
-                    <a:lstStyle/>
-                    <a:p>
-                      <a:pPr algn="ctr">
-                        <a:defRPr sz="1000" b="0">
-                          <a:solidFill>
-                            <a:srgbClr val="BBBBBB"/>
-                          </a:solidFill>
-                          <a:latin typeface="Calibri"/>
-                        </a:defRPr>
-                      </a:pPr>
-                      <a:r>
-                        <a:t>—</a:t>
-                      </a:r>
-                    </a:p>
-                  </a:txBody>
-                  <a:tcPr anchor="ctr" marL="45720" marR="45720" marT="27432" marB="27432">
-                    <a:solidFill>
-                      <a:srgbClr val="FFFFFF"/>
-                    </a:solidFill>
-                  </a:tcPr>
-                </a:tc>
-                <a:tc>
-                  <a:txBody>
-                    <a:bodyPr/>
-                    <a:lstStyle/>
-                    <a:p>
-                      <a:pPr algn="ctr">
-                        <a:defRPr sz="1000" b="0">
-                          <a:solidFill>
-                            <a:srgbClr val="16A34A"/>
-                          </a:solidFill>
-                          <a:latin typeface="Calibri"/>
-                        </a:defRPr>
-                      </a:pPr>
-                      <a:r>
-                        <a:t>✅</a:t>
-                      </a:r>
-                    </a:p>
-                  </a:txBody>
-                  <a:tcPr anchor="ctr" marL="45720" marR="45720" marT="27432" marB="27432">
-                    <a:solidFill>
-                      <a:srgbClr val="FFFFFF"/>
-                    </a:solidFill>
-                  </a:tcPr>
-                </a:tc>
-              </a:tr>
-              <a:tr h="353187">
+              <a:tr h="333487">
                 <a:tc>
                   <a:txBody>
                     <a:bodyPr/>
@@ -7019,7 +7141,7 @@
                   </a:tcPr>
                 </a:tc>
               </a:tr>
-              <a:tr h="353187">
+              <a:tr h="333487">
                 <a:tc>
                   <a:txBody>
                     <a:bodyPr/>
@@ -7040,6 +7162,128 @@
                   </a:txBody>
                   <a:tcPr anchor="ctr" marL="45720" marR="45720" marT="27432" marB="27432">
                     <a:solidFill>
+                      <a:srgbClr val="F3F4F6"/>
+                    </a:solidFill>
+                  </a:tcPr>
+                </a:tc>
+                <a:tc>
+                  <a:txBody>
+                    <a:bodyPr/>
+                    <a:lstStyle/>
+                    <a:p>
+                      <a:pPr algn="ctr">
+                        <a:defRPr sz="1000" b="0">
+                          <a:solidFill>
+                            <a:srgbClr val="BBBBBB"/>
+                          </a:solidFill>
+                          <a:latin typeface="Calibri"/>
+                        </a:defRPr>
+                      </a:pPr>
+                      <a:r>
+                        <a:t>—</a:t>
+                      </a:r>
+                    </a:p>
+                  </a:txBody>
+                  <a:tcPr anchor="ctr" marL="45720" marR="45720" marT="27432" marB="27432">
+                    <a:solidFill>
+                      <a:srgbClr val="F3F4F6"/>
+                    </a:solidFill>
+                  </a:tcPr>
+                </a:tc>
+                <a:tc>
+                  <a:txBody>
+                    <a:bodyPr/>
+                    <a:lstStyle/>
+                    <a:p>
+                      <a:pPr algn="ctr">
+                        <a:defRPr sz="1000" b="0">
+                          <a:solidFill>
+                            <a:srgbClr val="BBBBBB"/>
+                          </a:solidFill>
+                          <a:latin typeface="Calibri"/>
+                        </a:defRPr>
+                      </a:pPr>
+                      <a:r>
+                        <a:t>—</a:t>
+                      </a:r>
+                    </a:p>
+                  </a:txBody>
+                  <a:tcPr anchor="ctr" marL="45720" marR="45720" marT="27432" marB="27432">
+                    <a:solidFill>
+                      <a:srgbClr val="F3F4F6"/>
+                    </a:solidFill>
+                  </a:tcPr>
+                </a:tc>
+                <a:tc>
+                  <a:txBody>
+                    <a:bodyPr/>
+                    <a:lstStyle/>
+                    <a:p>
+                      <a:pPr algn="ctr">
+                        <a:defRPr sz="1000" b="0">
+                          <a:solidFill>
+                            <a:srgbClr val="16A34A"/>
+                          </a:solidFill>
+                          <a:latin typeface="Calibri"/>
+                        </a:defRPr>
+                      </a:pPr>
+                      <a:r>
+                        <a:t>✅</a:t>
+                      </a:r>
+                    </a:p>
+                  </a:txBody>
+                  <a:tcPr anchor="ctr" marL="45720" marR="45720" marT="27432" marB="27432">
+                    <a:solidFill>
+                      <a:srgbClr val="F3F4F6"/>
+                    </a:solidFill>
+                  </a:tcPr>
+                </a:tc>
+                <a:tc>
+                  <a:txBody>
+                    <a:bodyPr/>
+                    <a:lstStyle/>
+                    <a:p>
+                      <a:pPr algn="ctr">
+                        <a:defRPr sz="1000" b="0">
+                          <a:solidFill>
+                            <a:srgbClr val="16A34A"/>
+                          </a:solidFill>
+                          <a:latin typeface="Calibri"/>
+                        </a:defRPr>
+                      </a:pPr>
+                      <a:r>
+                        <a:t>✅</a:t>
+                      </a:r>
+                    </a:p>
+                  </a:txBody>
+                  <a:tcPr anchor="ctr" marL="45720" marR="45720" marT="27432" marB="27432">
+                    <a:solidFill>
+                      <a:srgbClr val="F3F4F6"/>
+                    </a:solidFill>
+                  </a:tcPr>
+                </a:tc>
+              </a:tr>
+              <a:tr h="333487">
+                <a:tc>
+                  <a:txBody>
+                    <a:bodyPr/>
+                    <a:lstStyle/>
+                    <a:p>
+                      <a:pPr algn="l">
+                        <a:defRPr sz="1000" b="0">
+                          <a:solidFill>
+                            <a:srgbClr val="1F2937"/>
+                          </a:solidFill>
+                          <a:latin typeface="Calibri"/>
+                        </a:defRPr>
+                      </a:pPr>
+                      <a:r>
+                        <a:t>Bot-Empfehlungen (in Evaluation)</a:t>
+                      </a:r>
+                    </a:p>
+                  </a:txBody>
+                  <a:tcPr anchor="ctr" marL="45720" marR="45720" marT="27432" marB="27432">
+                    <a:solidFill>
                       <a:srgbClr val="FFFFFF"/>
                     </a:solidFill>
                   </a:tcPr>
@@ -7141,7 +7385,7 @@
                   </a:tcPr>
                 </a:tc>
               </a:tr>
-              <a:tr h="353187">
+              <a:tr h="333488">
                 <a:tc>
                   <a:txBody>
                     <a:bodyPr/>
@@ -7156,7 +7400,7 @@
                         </a:defRPr>
                       </a:pPr>
                       <a:r>
-                        <a:t>Bot-Empfehlungen (in Evaluation)</a:t>
+                        <a:t>PEP Lösungsblockaden (Dr. Bohne)</a:t>
                       </a:r>
                     </a:p>
                   </a:txBody>
@@ -7222,6 +7466,30 @@
                       <a:pPr algn="ctr">
                         <a:defRPr sz="1000" b="0">
                           <a:solidFill>
+                            <a:srgbClr val="BBBBBB"/>
+                          </a:solidFill>
+                          <a:latin typeface="Calibri"/>
+                        </a:defRPr>
+                      </a:pPr>
+                      <a:r>
+                        <a:t>—</a:t>
+                      </a:r>
+                    </a:p>
+                  </a:txBody>
+                  <a:tcPr anchor="ctr" marL="45720" marR="45720" marT="27432" marB="27432">
+                    <a:solidFill>
+                      <a:srgbClr val="F3F4F6"/>
+                    </a:solidFill>
+                  </a:tcPr>
+                </a:tc>
+                <a:tc>
+                  <a:txBody>
+                    <a:bodyPr/>
+                    <a:lstStyle/>
+                    <a:p>
+                      <a:pPr algn="ctr">
+                        <a:defRPr sz="1000" b="0">
+                          <a:solidFill>
                             <a:srgbClr val="16A34A"/>
                           </a:solidFill>
                           <a:latin typeface="Calibri"/>
@@ -7235,152 +7503,6 @@
                   <a:tcPr anchor="ctr" marL="45720" marR="45720" marT="27432" marB="27432">
                     <a:solidFill>
                       <a:srgbClr val="F3F4F6"/>
-                    </a:solidFill>
-                  </a:tcPr>
-                </a:tc>
-                <a:tc>
-                  <a:txBody>
-                    <a:bodyPr/>
-                    <a:lstStyle/>
-                    <a:p>
-                      <a:pPr algn="ctr">
-                        <a:defRPr sz="1000" b="0">
-                          <a:solidFill>
-                            <a:srgbClr val="16A34A"/>
-                          </a:solidFill>
-                          <a:latin typeface="Calibri"/>
-                        </a:defRPr>
-                      </a:pPr>
-                      <a:r>
-                        <a:t>✅</a:t>
-                      </a:r>
-                    </a:p>
-                  </a:txBody>
-                  <a:tcPr anchor="ctr" marL="45720" marR="45720" marT="27432" marB="27432">
-                    <a:solidFill>
-                      <a:srgbClr val="F3F4F6"/>
-                    </a:solidFill>
-                  </a:tcPr>
-                </a:tc>
-              </a:tr>
-              <a:tr h="353187">
-                <a:tc>
-                  <a:txBody>
-                    <a:bodyPr/>
-                    <a:lstStyle/>
-                    <a:p>
-                      <a:pPr algn="l">
-                        <a:defRPr sz="1000" b="0">
-                          <a:solidFill>
-                            <a:srgbClr val="1F2937"/>
-                          </a:solidFill>
-                          <a:latin typeface="Calibri"/>
-                        </a:defRPr>
-                      </a:pPr>
-                      <a:r>
-                        <a:t>PEP Lösungsblockaden (Dr. Bohne)</a:t>
-                      </a:r>
-                    </a:p>
-                  </a:txBody>
-                  <a:tcPr anchor="ctr" marL="45720" marR="45720" marT="27432" marB="27432">
-                    <a:solidFill>
-                      <a:srgbClr val="FFFFFF"/>
-                    </a:solidFill>
-                  </a:tcPr>
-                </a:tc>
-                <a:tc>
-                  <a:txBody>
-                    <a:bodyPr/>
-                    <a:lstStyle/>
-                    <a:p>
-                      <a:pPr algn="ctr">
-                        <a:defRPr sz="1000" b="0">
-                          <a:solidFill>
-                            <a:srgbClr val="BBBBBB"/>
-                          </a:solidFill>
-                          <a:latin typeface="Calibri"/>
-                        </a:defRPr>
-                      </a:pPr>
-                      <a:r>
-                        <a:t>—</a:t>
-                      </a:r>
-                    </a:p>
-                  </a:txBody>
-                  <a:tcPr anchor="ctr" marL="45720" marR="45720" marT="27432" marB="27432">
-                    <a:solidFill>
-                      <a:srgbClr val="FFFFFF"/>
-                    </a:solidFill>
-                  </a:tcPr>
-                </a:tc>
-                <a:tc>
-                  <a:txBody>
-                    <a:bodyPr/>
-                    <a:lstStyle/>
-                    <a:p>
-                      <a:pPr algn="ctr">
-                        <a:defRPr sz="1000" b="0">
-                          <a:solidFill>
-                            <a:srgbClr val="BBBBBB"/>
-                          </a:solidFill>
-                          <a:latin typeface="Calibri"/>
-                        </a:defRPr>
-                      </a:pPr>
-                      <a:r>
-                        <a:t>—</a:t>
-                      </a:r>
-                    </a:p>
-                  </a:txBody>
-                  <a:tcPr anchor="ctr" marL="45720" marR="45720" marT="27432" marB="27432">
-                    <a:solidFill>
-                      <a:srgbClr val="FFFFFF"/>
-                    </a:solidFill>
-                  </a:tcPr>
-                </a:tc>
-                <a:tc>
-                  <a:txBody>
-                    <a:bodyPr/>
-                    <a:lstStyle/>
-                    <a:p>
-                      <a:pPr algn="ctr">
-                        <a:defRPr sz="1000" b="0">
-                          <a:solidFill>
-                            <a:srgbClr val="BBBBBB"/>
-                          </a:solidFill>
-                          <a:latin typeface="Calibri"/>
-                        </a:defRPr>
-                      </a:pPr>
-                      <a:r>
-                        <a:t>—</a:t>
-                      </a:r>
-                    </a:p>
-                  </a:txBody>
-                  <a:tcPr anchor="ctr" marL="45720" marR="45720" marT="27432" marB="27432">
-                    <a:solidFill>
-                      <a:srgbClr val="FFFFFF"/>
-                    </a:solidFill>
-                  </a:tcPr>
-                </a:tc>
-                <a:tc>
-                  <a:txBody>
-                    <a:bodyPr/>
-                    <a:lstStyle/>
-                    <a:p>
-                      <a:pPr algn="ctr">
-                        <a:defRPr sz="1000" b="0">
-                          <a:solidFill>
-                            <a:srgbClr val="16A34A"/>
-                          </a:solidFill>
-                          <a:latin typeface="Calibri"/>
-                        </a:defRPr>
-                      </a:pPr>
-                      <a:r>
-                        <a:t>✅</a:t>
-                      </a:r>
-                    </a:p>
-                  </a:txBody>
-                  <a:tcPr anchor="ctr" marL="45720" marR="45720" marT="27432" marB="27432">
-                    <a:solidFill>
-                      <a:srgbClr val="FFFFFF"/>
                     </a:solidFill>
                   </a:tcPr>
                 </a:tc>
@@ -8101,7 +8223,7 @@
               </a:defRPr>
             </a:pPr>
             <a:r>
-              <a:t>✓ Cloud-Sync &amp; E2EE</a:t>
+              <a:t>✓ Gloria Interview (Transkript)</a:t>
             </a:r>
           </a:p>
         </p:txBody>
@@ -8137,7 +8259,7 @@
               </a:defRPr>
             </a:pPr>
             <a:r>
-              <a:t>✓ Server-TTS (High Quality)</a:t>
+              <a:t>✓ Cloud-Sync &amp; E2EE</a:t>
             </a:r>
           </a:p>
         </p:txBody>
@@ -8173,7 +8295,7 @@
               </a:defRPr>
             </a:pPr>
             <a:r>
-              <a:t>✓ OCEAN-Profil &amp; Signature</a:t>
+              <a:t>✓ Server-TTS (High Quality)</a:t>
             </a:r>
           </a:p>
         </p:txBody>
@@ -8209,7 +8331,7 @@
               </a:defRPr>
             </a:pPr>
             <a:r>
-              <a:t>✓ DPC &amp; PDF-Export</a:t>
+              <a:t>✓ OCEAN-Profil, Signature, DPC</a:t>
             </a:r>
           </a:p>
         </p:txBody>
@@ -9390,7 +9512,7 @@
               </a:defRPr>
             </a:pPr>
             <a:r>
-              <a:t>Stets verfügbar — Guest-Tier</a:t>
+              <a:t>Nobody &amp; Gloria: Guest  |  Gloria Interview: Registered</a:t>
             </a:r>
           </a:p>
         </p:txBody>
@@ -9541,7 +9663,7 @@
               </a:defRPr>
             </a:pPr>
             <a:r>
-              <a:t>Gloria</a:t>
+              <a:t>Gloria Interview</a:t>
             </a:r>
           </a:p>
         </p:txBody>
@@ -9577,6 +9699,78 @@
               </a:defRPr>
             </a:pPr>
             <a:r>
+              <a:t>Strukturierte Interviews mit Transkript-Export</a:t>
+            </a:r>
+          </a:p>
+        </p:txBody>
+      </p:sp>
+      <p:sp>
+        <p:nvSpPr>
+          <p:cNvPr id="12" name="TextBox 11"/>
+          <p:cNvSpPr txBox="1"/>
+          <p:nvPr/>
+        </p:nvSpPr>
+        <p:spPr>
+          <a:xfrm>
+            <a:off x="792327" y="4023360"/>
+            <a:ext cx="3017520" cy="274320"/>
+          </a:xfrm>
+          <a:prstGeom prst="rect">
+            <a:avLst/>
+          </a:prstGeom>
+          <a:noFill/>
+        </p:spPr>
+        <p:txBody>
+          <a:bodyPr wrap="square">
+            <a:spAutoFit/>
+          </a:bodyPr>
+          <a:lstStyle/>
+          <a:p>
+            <a:pPr algn="l">
+              <a:defRPr sz="1400" b="1">
+                <a:solidFill>
+                  <a:srgbClr val="1F2937"/>
+                </a:solidFill>
+                <a:latin typeface="Calibri"/>
+              </a:defRPr>
+            </a:pPr>
+            <a:r>
+              <a:t>Gloria</a:t>
+            </a:r>
+          </a:p>
+        </p:txBody>
+      </p:sp>
+      <p:sp>
+        <p:nvSpPr>
+          <p:cNvPr id="13" name="TextBox 12"/>
+          <p:cNvSpPr txBox="1"/>
+          <p:nvPr/>
+        </p:nvSpPr>
+        <p:spPr>
+          <a:xfrm>
+            <a:off x="792327" y="4315968"/>
+            <a:ext cx="3017520" cy="457200"/>
+          </a:xfrm>
+          <a:prstGeom prst="rect">
+            <a:avLst/>
+          </a:prstGeom>
+          <a:noFill/>
+        </p:spPr>
+        <p:txBody>
+          <a:bodyPr wrap="square">
+            <a:spAutoFit/>
+          </a:bodyPr>
+          <a:lstStyle/>
+          <a:p>
+            <a:pPr algn="l">
+              <a:defRPr sz="1000" b="0">
+                <a:solidFill>
+                  <a:srgbClr val="6B7280"/>
+                </a:solidFill>
+                <a:latin typeface="Calibri"/>
+              </a:defRPr>
+            </a:pPr>
+            <a:r>
               <a:t>Onboarding &amp; Erstgespräch</a:t>
             </a:r>
           </a:p>
@@ -9584,7 +9778,7 @@
       </p:sp>
       <p:sp>
         <p:nvSpPr>
-          <p:cNvPr id="12" name="Rounded Rectangle 11"/>
+          <p:cNvPr id="14" name="Rounded Rectangle 13"/>
           <p:cNvSpPr/>
           <p:nvPr/>
         </p:nvSpPr>
@@ -9631,7 +9825,7 @@
       </p:sp>
       <p:sp>
         <p:nvSpPr>
-          <p:cNvPr id="13" name="TextBox 12"/>
+          <p:cNvPr id="15" name="TextBox 14"/>
           <p:cNvSpPr txBox="1"/>
           <p:nvPr/>
         </p:nvSpPr>
@@ -9667,7 +9861,7 @@
       </p:sp>
       <p:sp>
         <p:nvSpPr>
-          <p:cNvPr id="14" name="TextBox 13"/>
+          <p:cNvPr id="16" name="TextBox 15"/>
           <p:cNvSpPr txBox="1"/>
           <p:nvPr/>
         </p:nvSpPr>
@@ -9703,7 +9897,7 @@
       </p:sp>
       <p:sp>
         <p:nvSpPr>
-          <p:cNvPr id="15" name="Rectangle 14"/>
+          <p:cNvPr id="17" name="Rectangle 16"/>
           <p:cNvSpPr/>
           <p:nvPr/>
         </p:nvSpPr>
@@ -9746,7 +9940,7 @@
       </p:sp>
       <p:sp>
         <p:nvSpPr>
-          <p:cNvPr id="16" name="TextBox 15"/>
+          <p:cNvPr id="18" name="TextBox 17"/>
           <p:cNvSpPr txBox="1"/>
           <p:nvPr/>
         </p:nvSpPr>
@@ -9782,7 +9976,7 @@
       </p:sp>
       <p:sp>
         <p:nvSpPr>
-          <p:cNvPr id="17" name="TextBox 16"/>
+          <p:cNvPr id="19" name="TextBox 18"/>
           <p:cNvSpPr txBox="1"/>
           <p:nvPr/>
         </p:nvSpPr>
@@ -9818,7 +10012,7 @@
       </p:sp>
       <p:sp>
         <p:nvSpPr>
-          <p:cNvPr id="18" name="TextBox 17"/>
+          <p:cNvPr id="20" name="TextBox 19"/>
           <p:cNvSpPr txBox="1"/>
           <p:nvPr/>
         </p:nvSpPr>
@@ -9854,7 +10048,7 @@
       </p:sp>
       <p:sp>
         <p:nvSpPr>
-          <p:cNvPr id="19" name="TextBox 18"/>
+          <p:cNvPr id="21" name="TextBox 20"/>
           <p:cNvSpPr txBox="1"/>
           <p:nvPr/>
         </p:nvSpPr>
@@ -9890,7 +10084,7 @@
       </p:sp>
       <p:sp>
         <p:nvSpPr>
-          <p:cNvPr id="20" name="TextBox 19"/>
+          <p:cNvPr id="22" name="TextBox 21"/>
           <p:cNvSpPr txBox="1"/>
           <p:nvPr/>
         </p:nvSpPr>
@@ -9926,7 +10120,7 @@
       </p:sp>
       <p:sp>
         <p:nvSpPr>
-          <p:cNvPr id="21" name="TextBox 20"/>
+          <p:cNvPr id="23" name="TextBox 22"/>
           <p:cNvSpPr txBox="1"/>
           <p:nvPr/>
         </p:nvSpPr>
@@ -9962,7 +10156,7 @@
       </p:sp>
       <p:sp>
         <p:nvSpPr>
-          <p:cNvPr id="22" name="TextBox 21"/>
+          <p:cNvPr id="24" name="TextBox 23"/>
           <p:cNvSpPr txBox="1"/>
           <p:nvPr/>
         </p:nvSpPr>
@@ -9998,7 +10192,7 @@
       </p:sp>
       <p:sp>
         <p:nvSpPr>
-          <p:cNvPr id="23" name="TextBox 22"/>
+          <p:cNvPr id="25" name="TextBox 24"/>
           <p:cNvSpPr txBox="1"/>
           <p:nvPr/>
         </p:nvSpPr>
@@ -10034,7 +10228,7 @@
       </p:sp>
       <p:sp>
         <p:nvSpPr>
-          <p:cNvPr id="24" name="Rounded Rectangle 23"/>
+          <p:cNvPr id="26" name="Rounded Rectangle 25"/>
           <p:cNvSpPr/>
           <p:nvPr/>
         </p:nvSpPr>
@@ -10081,7 +10275,7 @@
       </p:sp>
       <p:sp>
         <p:nvSpPr>
-          <p:cNvPr id="25" name="TextBox 24"/>
+          <p:cNvPr id="27" name="TextBox 26"/>
           <p:cNvSpPr txBox="1"/>
           <p:nvPr/>
         </p:nvSpPr>
@@ -10117,7 +10311,7 @@
       </p:sp>
       <p:sp>
         <p:nvSpPr>
-          <p:cNvPr id="26" name="TextBox 25"/>
+          <p:cNvPr id="28" name="TextBox 27"/>
           <p:cNvSpPr txBox="1"/>
           <p:nvPr/>
         </p:nvSpPr>
@@ -10153,7 +10347,7 @@
       </p:sp>
       <p:sp>
         <p:nvSpPr>
-          <p:cNvPr id="27" name="Rectangle 26"/>
+          <p:cNvPr id="29" name="Rectangle 28"/>
           <p:cNvSpPr/>
           <p:nvPr/>
         </p:nvSpPr>
@@ -10196,7 +10390,7 @@
       </p:sp>
       <p:sp>
         <p:nvSpPr>
-          <p:cNvPr id="28" name="TextBox 27"/>
+          <p:cNvPr id="30" name="TextBox 29"/>
           <p:cNvSpPr txBox="1"/>
           <p:nvPr/>
         </p:nvSpPr>
@@ -10232,7 +10426,7 @@
       </p:sp>
       <p:sp>
         <p:nvSpPr>
-          <p:cNvPr id="29" name="TextBox 28"/>
+          <p:cNvPr id="31" name="TextBox 30"/>
           <p:cNvSpPr txBox="1"/>
           <p:nvPr/>
         </p:nvSpPr>
@@ -10268,7 +10462,7 @@
       </p:sp>
       <p:sp>
         <p:nvSpPr>
-          <p:cNvPr id="30" name="TextBox 29"/>
+          <p:cNvPr id="32" name="TextBox 31"/>
           <p:cNvSpPr txBox="1"/>
           <p:nvPr/>
         </p:nvSpPr>
@@ -10304,7 +10498,7 @@
       </p:sp>
       <p:sp>
         <p:nvSpPr>
-          <p:cNvPr id="31" name="TextBox 30"/>
+          <p:cNvPr id="33" name="TextBox 32"/>
           <p:cNvSpPr txBox="1"/>
           <p:nvPr/>
         </p:nvSpPr>
@@ -10340,7 +10534,7 @@
       </p:sp>
       <p:sp>
         <p:nvSpPr>
-          <p:cNvPr id="32" name="TextBox 31"/>
+          <p:cNvPr id="34" name="TextBox 33"/>
           <p:cNvSpPr txBox="1"/>
           <p:nvPr/>
         </p:nvSpPr>

</xml_diff>